<commit_message>
Added release flow images
</commit_message>
<xml_diff>
--- a/BranchingStratergy.pptx
+++ b/BranchingStratergy.pptx
@@ -6,9 +6,9 @@
   </p:sldMasterIdLst>
   <p:sldIdLst>
     <p:sldId id="256" r:id="rId2"/>
-    <p:sldId id="259" r:id="rId3"/>
-    <p:sldId id="260" r:id="rId4"/>
-    <p:sldId id="261" r:id="rId5"/>
+    <p:sldId id="260" r:id="rId3"/>
+    <p:sldId id="261" r:id="rId4"/>
+    <p:sldId id="259" r:id="rId5"/>
   </p:sldIdLst>
   <p:sldSz cx="12192000" cy="6858000"/>
   <p:notesSz cx="6858000" cy="9144000"/>
@@ -3350,32 +3350,15 @@
           <a:bodyPr/>
           <a:lstStyle/>
           <a:p>
-            <a:endParaRPr lang="en-US"/>
-          </a:p>
-        </p:txBody>
-      </p:sp>
-      <p:sp>
-        <p:nvSpPr>
-          <p:cNvPr id="3" name="Subtitle 2">
-            <a:extLst>
-              <a:ext uri="{FF2B5EF4-FFF2-40B4-BE49-F238E27FC236}">
-                <a16:creationId xmlns:a16="http://schemas.microsoft.com/office/drawing/2014/main" id="{2E8A5288-1679-483E-A822-C2C265CAE285}"/>
-              </a:ext>
-            </a:extLst>
-          </p:cNvPr>
-          <p:cNvSpPr>
-            <a:spLocks noGrp="1"/>
-          </p:cNvSpPr>
-          <p:nvPr>
-            <p:ph type="subTitle" idx="1"/>
-          </p:nvPr>
-        </p:nvSpPr>
-        <p:spPr/>
-        <p:txBody>
-          <a:bodyPr/>
-          <a:lstStyle/>
-          <a:p>
-            <a:endParaRPr lang="en-US"/>
+            <a:r>
+              <a:rPr lang="en-US" dirty="0"/>
+              <a:t>Branching </a:t>
+            </a:r>
+            <a:r>
+              <a:rPr lang="en-US" dirty="0" err="1"/>
+              <a:t>Stratergies</a:t>
+            </a:r>
+            <a:endParaRPr lang="en-US" dirty="0"/>
           </a:p>
         </p:txBody>
       </p:sp>
@@ -3572,122 +3555,6 @@
       </p:grpSpPr>
       <p:sp>
         <p:nvSpPr>
-          <p:cNvPr id="79" name="Rectangle 78">
-            <a:extLst>
-              <a:ext uri="{FF2B5EF4-FFF2-40B4-BE49-F238E27FC236}">
-                <a16:creationId xmlns:a16="http://schemas.microsoft.com/office/drawing/2014/main" id="{79162968-0856-47E9-B068-327A6AFDC972}"/>
-              </a:ext>
-            </a:extLst>
-          </p:cNvPr>
-          <p:cNvSpPr/>
-          <p:nvPr/>
-        </p:nvSpPr>
-        <p:spPr>
-          <a:xfrm>
-            <a:off x="7840999" y="1872136"/>
-            <a:ext cx="1491874" cy="656940"/>
-          </a:xfrm>
-          <a:prstGeom prst="rect">
-            <a:avLst/>
-          </a:prstGeom>
-          <a:solidFill>
-            <a:srgbClr val="00B050">
-              <a:alpha val="30000"/>
-            </a:srgbClr>
-          </a:solidFill>
-          <a:ln w="19050"/>
-        </p:spPr>
-        <p:style>
-          <a:lnRef idx="2">
-            <a:schemeClr val="accent1">
-              <a:shade val="50000"/>
-            </a:schemeClr>
-          </a:lnRef>
-          <a:fillRef idx="1">
-            <a:schemeClr val="accent1"/>
-          </a:fillRef>
-          <a:effectRef idx="0">
-            <a:schemeClr val="accent1"/>
-          </a:effectRef>
-          <a:fontRef idx="minor">
-            <a:schemeClr val="lt1"/>
-          </a:fontRef>
-        </p:style>
-        <p:txBody>
-          <a:bodyPr rtlCol="0" anchor="t" anchorCtr="0"/>
-          <a:lstStyle/>
-          <a:p>
-            <a:r>
-              <a:rPr lang="en-US" sz="1200" dirty="0">
-                <a:solidFill>
-                  <a:schemeClr val="tx1"/>
-                </a:solidFill>
-              </a:rPr>
-              <a:t>release-mkt2</a:t>
-            </a:r>
-          </a:p>
-        </p:txBody>
-      </p:sp>
-      <p:sp>
-        <p:nvSpPr>
-          <p:cNvPr id="45" name="Rectangle 44">
-            <a:extLst>
-              <a:ext uri="{FF2B5EF4-FFF2-40B4-BE49-F238E27FC236}">
-                <a16:creationId xmlns:a16="http://schemas.microsoft.com/office/drawing/2014/main" id="{BD794871-0F14-40F2-B203-9660E5DC1E36}"/>
-              </a:ext>
-            </a:extLst>
-          </p:cNvPr>
-          <p:cNvSpPr/>
-          <p:nvPr/>
-        </p:nvSpPr>
-        <p:spPr>
-          <a:xfrm>
-            <a:off x="5056234" y="992983"/>
-            <a:ext cx="2816888" cy="656940"/>
-          </a:xfrm>
-          <a:prstGeom prst="rect">
-            <a:avLst/>
-          </a:prstGeom>
-          <a:solidFill>
-            <a:srgbClr val="00B050">
-              <a:alpha val="30000"/>
-            </a:srgbClr>
-          </a:solidFill>
-          <a:ln w="19050"/>
-        </p:spPr>
-        <p:style>
-          <a:lnRef idx="2">
-            <a:schemeClr val="accent1">
-              <a:shade val="50000"/>
-            </a:schemeClr>
-          </a:lnRef>
-          <a:fillRef idx="1">
-            <a:schemeClr val="accent1"/>
-          </a:fillRef>
-          <a:effectRef idx="0">
-            <a:schemeClr val="accent1"/>
-          </a:effectRef>
-          <a:fontRef idx="minor">
-            <a:schemeClr val="lt1"/>
-          </a:fontRef>
-        </p:style>
-        <p:txBody>
-          <a:bodyPr rtlCol="0" anchor="t" anchorCtr="0"/>
-          <a:lstStyle/>
-          <a:p>
-            <a:r>
-              <a:rPr lang="en-US" sz="1200" dirty="0">
-                <a:solidFill>
-                  <a:schemeClr val="tx1"/>
-                </a:solidFill>
-              </a:rPr>
-              <a:t>release-mkt1</a:t>
-            </a:r>
-          </a:p>
-        </p:txBody>
-      </p:sp>
-      <p:sp>
-        <p:nvSpPr>
           <p:cNvPr id="43" name="Rectangle 42">
             <a:extLst>
               <a:ext uri="{FF2B5EF4-FFF2-40B4-BE49-F238E27FC236}">
@@ -3735,76 +3602,12 @@
           <a:lstStyle/>
           <a:p>
             <a:r>
-              <a:rPr lang="en-US" sz="1200">
+              <a:rPr lang="en-US" sz="1200" dirty="0">
                 <a:solidFill>
                   <a:schemeClr val="tx1"/>
                 </a:solidFill>
               </a:rPr>
               <a:t>feture-feature1</a:t>
-            </a:r>
-            <a:endParaRPr lang="en-US" sz="1200" dirty="0">
-              <a:solidFill>
-                <a:schemeClr val="tx1"/>
-              </a:solidFill>
-            </a:endParaRPr>
-          </a:p>
-        </p:txBody>
-      </p:sp>
-      <p:sp>
-        <p:nvSpPr>
-          <p:cNvPr id="44" name="Rectangle 43">
-            <a:extLst>
-              <a:ext uri="{FF2B5EF4-FFF2-40B4-BE49-F238E27FC236}">
-                <a16:creationId xmlns:a16="http://schemas.microsoft.com/office/drawing/2014/main" id="{5BC2FAE5-EDC4-42E1-9456-5DA44D4A7225}"/>
-              </a:ext>
-            </a:extLst>
-          </p:cNvPr>
-          <p:cNvSpPr/>
-          <p:nvPr/>
-        </p:nvSpPr>
-        <p:spPr>
-          <a:xfrm>
-            <a:off x="2496487" y="4476239"/>
-            <a:ext cx="3683665" cy="656940"/>
-          </a:xfrm>
-          <a:prstGeom prst="rect">
-            <a:avLst/>
-          </a:prstGeom>
-          <a:solidFill>
-            <a:schemeClr val="accent2">
-              <a:lumMod val="75000"/>
-              <a:alpha val="30000"/>
-            </a:schemeClr>
-          </a:solidFill>
-          <a:ln w="19050"/>
-        </p:spPr>
-        <p:style>
-          <a:lnRef idx="2">
-            <a:schemeClr val="accent1">
-              <a:shade val="50000"/>
-            </a:schemeClr>
-          </a:lnRef>
-          <a:fillRef idx="1">
-            <a:schemeClr val="accent1"/>
-          </a:fillRef>
-          <a:effectRef idx="0">
-            <a:schemeClr val="accent1"/>
-          </a:effectRef>
-          <a:fontRef idx="minor">
-            <a:schemeClr val="lt1"/>
-          </a:fontRef>
-        </p:style>
-        <p:txBody>
-          <a:bodyPr rtlCol="0" anchor="b" anchorCtr="0"/>
-          <a:lstStyle/>
-          <a:p>
-            <a:r>
-              <a:rPr lang="en-US" sz="1200" dirty="0">
-                <a:solidFill>
-                  <a:schemeClr val="tx1"/>
-                </a:solidFill>
-              </a:rPr>
-              <a:t>feature-feature2</a:t>
             </a:r>
           </a:p>
         </p:txBody>
@@ -3959,49 +3762,6 @@
           </a:fontRef>
         </p:style>
       </p:cxnSp>
-      <p:cxnSp>
-        <p:nvCxnSpPr>
-          <p:cNvPr id="7" name="Straight Arrow Connector 6">
-            <a:extLst>
-              <a:ext uri="{FF2B5EF4-FFF2-40B4-BE49-F238E27FC236}">
-                <a16:creationId xmlns:a16="http://schemas.microsoft.com/office/drawing/2014/main" id="{AF8EF468-C3FE-4998-9B4F-DCFFB6A5C17A}"/>
-              </a:ext>
-            </a:extLst>
-          </p:cNvPr>
-          <p:cNvCxnSpPr>
-            <a:cxnSpLocks/>
-            <a:stCxn id="4" idx="5"/>
-            <a:endCxn id="15" idx="2"/>
-          </p:cNvCxnSpPr>
-          <p:nvPr/>
-        </p:nvCxnSpPr>
-        <p:spPr>
-          <a:xfrm>
-            <a:off x="702657" y="3676618"/>
-            <a:ext cx="1927323" cy="1068727"/>
-          </a:xfrm>
-          <a:prstGeom prst="straightConnector1">
-            <a:avLst/>
-          </a:prstGeom>
-          <a:ln w="25400">
-            <a:tailEnd type="triangle"/>
-          </a:ln>
-        </p:spPr>
-        <p:style>
-          <a:lnRef idx="1">
-            <a:schemeClr val="accent1"/>
-          </a:lnRef>
-          <a:fillRef idx="0">
-            <a:schemeClr val="accent1"/>
-          </a:fillRef>
-          <a:effectRef idx="0">
-            <a:schemeClr val="accent1"/>
-          </a:effectRef>
-          <a:fontRef idx="minor">
-            <a:schemeClr val="tx1"/>
-          </a:fontRef>
-        </p:style>
-      </p:cxnSp>
       <p:sp>
         <p:nvSpPr>
           <p:cNvPr id="12" name="Oval 11">
@@ -4047,55 +3807,6 @@
             <a:r>
               <a:rPr lang="en-US" dirty="0"/>
               <a:t>b</a:t>
-            </a:r>
-          </a:p>
-        </p:txBody>
-      </p:sp>
-      <p:sp>
-        <p:nvSpPr>
-          <p:cNvPr id="15" name="Oval 14">
-            <a:extLst>
-              <a:ext uri="{FF2B5EF4-FFF2-40B4-BE49-F238E27FC236}">
-                <a16:creationId xmlns:a16="http://schemas.microsoft.com/office/drawing/2014/main" id="{579A86B5-8905-454F-9ED8-4348D2CAAF5D}"/>
-              </a:ext>
-            </a:extLst>
-          </p:cNvPr>
-          <p:cNvSpPr/>
-          <p:nvPr/>
-        </p:nvSpPr>
-        <p:spPr>
-          <a:xfrm>
-            <a:off x="2629980" y="4567791"/>
-            <a:ext cx="355107" cy="355107"/>
-          </a:xfrm>
-          <a:prstGeom prst="ellipse">
-            <a:avLst/>
-          </a:prstGeom>
-        </p:spPr>
-        <p:style>
-          <a:lnRef idx="2">
-            <a:schemeClr val="accent1">
-              <a:shade val="50000"/>
-            </a:schemeClr>
-          </a:lnRef>
-          <a:fillRef idx="1">
-            <a:schemeClr val="accent1"/>
-          </a:fillRef>
-          <a:effectRef idx="0">
-            <a:schemeClr val="accent1"/>
-          </a:effectRef>
-          <a:fontRef idx="minor">
-            <a:schemeClr val="lt1"/>
-          </a:fontRef>
-        </p:style>
-        <p:txBody>
-          <a:bodyPr rtlCol="0" anchor="ctr"/>
-          <a:lstStyle/>
-          <a:p>
-            <a:pPr algn="ctr"/>
-            <a:r>
-              <a:rPr lang="en-US" dirty="0"/>
-              <a:t>d</a:t>
             </a:r>
           </a:p>
         </p:txBody>
@@ -4511,324 +4222,6 @@
           </a:fontRef>
         </p:style>
       </p:cxnSp>
-      <p:sp>
-        <p:nvSpPr>
-          <p:cNvPr id="16" name="Oval 15">
-            <a:extLst>
-              <a:ext uri="{FF2B5EF4-FFF2-40B4-BE49-F238E27FC236}">
-                <a16:creationId xmlns:a16="http://schemas.microsoft.com/office/drawing/2014/main" id="{D6DEFA2E-7339-49EB-963A-BE8D7C695422}"/>
-              </a:ext>
-            </a:extLst>
-          </p:cNvPr>
-          <p:cNvSpPr/>
-          <p:nvPr/>
-        </p:nvSpPr>
-        <p:spPr>
-          <a:xfrm>
-            <a:off x="4767929" y="4567790"/>
-            <a:ext cx="355107" cy="355107"/>
-          </a:xfrm>
-          <a:prstGeom prst="ellipse">
-            <a:avLst/>
-          </a:prstGeom>
-        </p:spPr>
-        <p:style>
-          <a:lnRef idx="2">
-            <a:schemeClr val="accent1">
-              <a:shade val="50000"/>
-            </a:schemeClr>
-          </a:lnRef>
-          <a:fillRef idx="1">
-            <a:schemeClr val="accent1"/>
-          </a:fillRef>
-          <a:effectRef idx="0">
-            <a:schemeClr val="accent1"/>
-          </a:effectRef>
-          <a:fontRef idx="minor">
-            <a:schemeClr val="lt1"/>
-          </a:fontRef>
-        </p:style>
-        <p:txBody>
-          <a:bodyPr rtlCol="0" anchor="ctr"/>
-          <a:lstStyle/>
-          <a:p>
-            <a:pPr algn="ctr"/>
-            <a:r>
-              <a:rPr lang="en-US" dirty="0"/>
-              <a:t>h</a:t>
-            </a:r>
-          </a:p>
-        </p:txBody>
-      </p:sp>
-      <p:cxnSp>
-        <p:nvCxnSpPr>
-          <p:cNvPr id="17" name="Straight Arrow Connector 16">
-            <a:extLst>
-              <a:ext uri="{FF2B5EF4-FFF2-40B4-BE49-F238E27FC236}">
-                <a16:creationId xmlns:a16="http://schemas.microsoft.com/office/drawing/2014/main" id="{687CF31E-6039-4D80-A3F9-BAB0801EE342}"/>
-              </a:ext>
-            </a:extLst>
-          </p:cNvPr>
-          <p:cNvCxnSpPr>
-            <a:cxnSpLocks/>
-            <a:stCxn id="15" idx="6"/>
-            <a:endCxn id="16" idx="2"/>
-          </p:cNvCxnSpPr>
-          <p:nvPr/>
-        </p:nvCxnSpPr>
-        <p:spPr>
-          <a:xfrm flipV="1">
-            <a:off x="2985087" y="4745344"/>
-            <a:ext cx="1782842" cy="1"/>
-          </a:xfrm>
-          <a:prstGeom prst="straightConnector1">
-            <a:avLst/>
-          </a:prstGeom>
-          <a:ln w="25400">
-            <a:tailEnd type="triangle"/>
-          </a:ln>
-        </p:spPr>
-        <p:style>
-          <a:lnRef idx="1">
-            <a:schemeClr val="accent1"/>
-          </a:lnRef>
-          <a:fillRef idx="0">
-            <a:schemeClr val="accent1"/>
-          </a:fillRef>
-          <a:effectRef idx="0">
-            <a:schemeClr val="accent1"/>
-          </a:effectRef>
-          <a:fontRef idx="minor">
-            <a:schemeClr val="tx1"/>
-          </a:fontRef>
-        </p:style>
-      </p:cxnSp>
-      <p:sp>
-        <p:nvSpPr>
-          <p:cNvPr id="24" name="Oval 23">
-            <a:extLst>
-              <a:ext uri="{FF2B5EF4-FFF2-40B4-BE49-F238E27FC236}">
-                <a16:creationId xmlns:a16="http://schemas.microsoft.com/office/drawing/2014/main" id="{232A0D5E-E2B9-4DBE-9886-25514EEE2493}"/>
-              </a:ext>
-            </a:extLst>
-          </p:cNvPr>
-          <p:cNvSpPr/>
-          <p:nvPr/>
-        </p:nvSpPr>
-        <p:spPr>
-          <a:xfrm>
-            <a:off x="5683841" y="4567790"/>
-            <a:ext cx="355107" cy="355107"/>
-          </a:xfrm>
-          <a:prstGeom prst="ellipse">
-            <a:avLst/>
-          </a:prstGeom>
-        </p:spPr>
-        <p:style>
-          <a:lnRef idx="2">
-            <a:schemeClr val="accent1">
-              <a:shade val="50000"/>
-            </a:schemeClr>
-          </a:lnRef>
-          <a:fillRef idx="1">
-            <a:schemeClr val="accent1"/>
-          </a:fillRef>
-          <a:effectRef idx="0">
-            <a:schemeClr val="accent1"/>
-          </a:effectRef>
-          <a:fontRef idx="minor">
-            <a:schemeClr val="lt1"/>
-          </a:fontRef>
-        </p:style>
-        <p:txBody>
-          <a:bodyPr rtlCol="0" anchor="ctr"/>
-          <a:lstStyle/>
-          <a:p>
-            <a:pPr algn="ctr"/>
-            <a:r>
-              <a:rPr lang="en-US" dirty="0"/>
-              <a:t>j</a:t>
-            </a:r>
-          </a:p>
-        </p:txBody>
-      </p:sp>
-      <p:cxnSp>
-        <p:nvCxnSpPr>
-          <p:cNvPr id="25" name="Straight Arrow Connector 24">
-            <a:extLst>
-              <a:ext uri="{FF2B5EF4-FFF2-40B4-BE49-F238E27FC236}">
-                <a16:creationId xmlns:a16="http://schemas.microsoft.com/office/drawing/2014/main" id="{90C5DBDC-8C95-41B0-AE16-B6E21E847A64}"/>
-              </a:ext>
-            </a:extLst>
-          </p:cNvPr>
-          <p:cNvCxnSpPr>
-            <a:cxnSpLocks/>
-            <a:endCxn id="24" idx="1"/>
-          </p:cNvCxnSpPr>
-          <p:nvPr/>
-        </p:nvCxnSpPr>
-        <p:spPr>
-          <a:xfrm>
-            <a:off x="4563976" y="3676618"/>
-            <a:ext cx="1171869" cy="943176"/>
-          </a:xfrm>
-          <a:prstGeom prst="straightConnector1">
-            <a:avLst/>
-          </a:prstGeom>
-          <a:ln w="25400">
-            <a:tailEnd type="triangle"/>
-          </a:ln>
-        </p:spPr>
-        <p:style>
-          <a:lnRef idx="1">
-            <a:schemeClr val="accent1"/>
-          </a:lnRef>
-          <a:fillRef idx="0">
-            <a:schemeClr val="accent1"/>
-          </a:fillRef>
-          <a:effectRef idx="0">
-            <a:schemeClr val="accent1"/>
-          </a:effectRef>
-          <a:fontRef idx="minor">
-            <a:schemeClr val="tx1"/>
-          </a:fontRef>
-        </p:style>
-      </p:cxnSp>
-      <p:cxnSp>
-        <p:nvCxnSpPr>
-          <p:cNvPr id="27" name="Straight Arrow Connector 26">
-            <a:extLst>
-              <a:ext uri="{FF2B5EF4-FFF2-40B4-BE49-F238E27FC236}">
-                <a16:creationId xmlns:a16="http://schemas.microsoft.com/office/drawing/2014/main" id="{7DB98786-D659-4AC3-92C2-1A2FE8C27B93}"/>
-              </a:ext>
-            </a:extLst>
-          </p:cNvPr>
-          <p:cNvCxnSpPr>
-            <a:cxnSpLocks/>
-            <a:stCxn id="16" idx="6"/>
-            <a:endCxn id="24" idx="2"/>
-          </p:cNvCxnSpPr>
-          <p:nvPr/>
-        </p:nvCxnSpPr>
-        <p:spPr>
-          <a:xfrm>
-            <a:off x="5123036" y="4745344"/>
-            <a:ext cx="560805" cy="0"/>
-          </a:xfrm>
-          <a:prstGeom prst="straightConnector1">
-            <a:avLst/>
-          </a:prstGeom>
-          <a:ln w="25400">
-            <a:tailEnd type="triangle"/>
-          </a:ln>
-        </p:spPr>
-        <p:style>
-          <a:lnRef idx="1">
-            <a:schemeClr val="accent1"/>
-          </a:lnRef>
-          <a:fillRef idx="0">
-            <a:schemeClr val="accent1"/>
-          </a:fillRef>
-          <a:effectRef idx="0">
-            <a:schemeClr val="accent1"/>
-          </a:effectRef>
-          <a:fontRef idx="minor">
-            <a:schemeClr val="tx1"/>
-          </a:fontRef>
-        </p:style>
-      </p:cxnSp>
-      <p:sp>
-        <p:nvSpPr>
-          <p:cNvPr id="28" name="Oval 27">
-            <a:extLst>
-              <a:ext uri="{FF2B5EF4-FFF2-40B4-BE49-F238E27FC236}">
-                <a16:creationId xmlns:a16="http://schemas.microsoft.com/office/drawing/2014/main" id="{7F3812AE-7E85-40AB-9D3D-23A04778CB33}"/>
-              </a:ext>
-            </a:extLst>
-          </p:cNvPr>
-          <p:cNvSpPr/>
-          <p:nvPr/>
-        </p:nvSpPr>
-        <p:spPr>
-          <a:xfrm>
-            <a:off x="6287125" y="3379839"/>
-            <a:ext cx="355107" cy="355107"/>
-          </a:xfrm>
-          <a:prstGeom prst="ellipse">
-            <a:avLst/>
-          </a:prstGeom>
-        </p:spPr>
-        <p:style>
-          <a:lnRef idx="2">
-            <a:schemeClr val="accent1">
-              <a:shade val="50000"/>
-            </a:schemeClr>
-          </a:lnRef>
-          <a:fillRef idx="1">
-            <a:schemeClr val="accent1"/>
-          </a:fillRef>
-          <a:effectRef idx="0">
-            <a:schemeClr val="accent1"/>
-          </a:effectRef>
-          <a:fontRef idx="minor">
-            <a:schemeClr val="lt1"/>
-          </a:fontRef>
-        </p:style>
-        <p:txBody>
-          <a:bodyPr rtlCol="0" anchor="ctr"/>
-          <a:lstStyle/>
-          <a:p>
-            <a:pPr algn="ctr"/>
-            <a:r>
-              <a:rPr lang="en-US" dirty="0"/>
-              <a:t>k</a:t>
-            </a:r>
-          </a:p>
-        </p:txBody>
-      </p:sp>
-      <p:cxnSp>
-        <p:nvCxnSpPr>
-          <p:cNvPr id="30" name="Straight Arrow Connector 29">
-            <a:extLst>
-              <a:ext uri="{FF2B5EF4-FFF2-40B4-BE49-F238E27FC236}">
-                <a16:creationId xmlns:a16="http://schemas.microsoft.com/office/drawing/2014/main" id="{47B7DEDA-531C-4763-B4A1-09210BB148E7}"/>
-              </a:ext>
-            </a:extLst>
-          </p:cNvPr>
-          <p:cNvCxnSpPr>
-            <a:cxnSpLocks/>
-            <a:stCxn id="24" idx="7"/>
-            <a:endCxn id="28" idx="3"/>
-          </p:cNvCxnSpPr>
-          <p:nvPr/>
-        </p:nvCxnSpPr>
-        <p:spPr>
-          <a:xfrm flipV="1">
-            <a:off x="5986944" y="3682942"/>
-            <a:ext cx="352185" cy="936852"/>
-          </a:xfrm>
-          <a:prstGeom prst="straightConnector1">
-            <a:avLst/>
-          </a:prstGeom>
-          <a:ln w="25400">
-            <a:tailEnd type="triangle"/>
-          </a:ln>
-        </p:spPr>
-        <p:style>
-          <a:lnRef idx="1">
-            <a:schemeClr val="accent1"/>
-          </a:lnRef>
-          <a:fillRef idx="0">
-            <a:schemeClr val="accent1"/>
-          </a:fillRef>
-          <a:effectRef idx="0">
-            <a:schemeClr val="accent1"/>
-          </a:effectRef>
-          <a:fontRef idx="minor">
-            <a:schemeClr val="tx1"/>
-          </a:fontRef>
-        </p:style>
-      </p:cxnSp>
       <p:cxnSp>
         <p:nvCxnSpPr>
           <p:cNvPr id="34" name="Straight Arrow Connector 33">
@@ -4841,7 +4234,6 @@
           <p:cNvCxnSpPr>
             <a:cxnSpLocks/>
             <a:stCxn id="32" idx="6"/>
-            <a:endCxn id="28" idx="2"/>
           </p:cNvCxnSpPr>
           <p:nvPr/>
         </p:nvCxnSpPr>
@@ -4849,509 +4241,6 @@
           <a:xfrm>
             <a:off x="4563976" y="3551069"/>
             <a:ext cx="1723149" cy="6324"/>
-          </a:xfrm>
-          <a:prstGeom prst="straightConnector1">
-            <a:avLst/>
-          </a:prstGeom>
-          <a:ln w="25400">
-            <a:tailEnd type="triangle"/>
-          </a:ln>
-        </p:spPr>
-        <p:style>
-          <a:lnRef idx="1">
-            <a:schemeClr val="accent1"/>
-          </a:lnRef>
-          <a:fillRef idx="0">
-            <a:schemeClr val="accent1"/>
-          </a:fillRef>
-          <a:effectRef idx="0">
-            <a:schemeClr val="accent1"/>
-          </a:effectRef>
-          <a:fontRef idx="minor">
-            <a:schemeClr val="tx1"/>
-          </a:fontRef>
-        </p:style>
-      </p:cxnSp>
-      <p:sp>
-        <p:nvSpPr>
-          <p:cNvPr id="31" name="Oval 30">
-            <a:extLst>
-              <a:ext uri="{FF2B5EF4-FFF2-40B4-BE49-F238E27FC236}">
-                <a16:creationId xmlns:a16="http://schemas.microsoft.com/office/drawing/2014/main" id="{AE2B203A-6FD7-4FDA-9B72-6701AE951F9C}"/>
-              </a:ext>
-            </a:extLst>
-          </p:cNvPr>
-          <p:cNvSpPr/>
-          <p:nvPr/>
-        </p:nvSpPr>
-        <p:spPr>
-          <a:xfrm>
-            <a:off x="5231813" y="1216731"/>
-            <a:ext cx="355107" cy="355107"/>
-          </a:xfrm>
-          <a:prstGeom prst="ellipse">
-            <a:avLst/>
-          </a:prstGeom>
-        </p:spPr>
-        <p:style>
-          <a:lnRef idx="2">
-            <a:schemeClr val="accent1">
-              <a:shade val="50000"/>
-            </a:schemeClr>
-          </a:lnRef>
-          <a:fillRef idx="1">
-            <a:schemeClr val="accent1"/>
-          </a:fillRef>
-          <a:effectRef idx="0">
-            <a:schemeClr val="accent1"/>
-          </a:effectRef>
-          <a:fontRef idx="minor">
-            <a:schemeClr val="lt1"/>
-          </a:fontRef>
-        </p:style>
-        <p:txBody>
-          <a:bodyPr rtlCol="0" anchor="ctr"/>
-          <a:lstStyle/>
-          <a:p>
-            <a:pPr algn="ctr"/>
-            <a:r>
-              <a:rPr lang="en-US" dirty="0" err="1"/>
-              <a:t>i</a:t>
-            </a:r>
-            <a:endParaRPr lang="en-US" dirty="0"/>
-          </a:p>
-        </p:txBody>
-      </p:sp>
-      <p:cxnSp>
-        <p:nvCxnSpPr>
-          <p:cNvPr id="35" name="Straight Arrow Connector 34">
-            <a:extLst>
-              <a:ext uri="{FF2B5EF4-FFF2-40B4-BE49-F238E27FC236}">
-                <a16:creationId xmlns:a16="http://schemas.microsoft.com/office/drawing/2014/main" id="{1AFCD651-23DF-4F6E-A765-0F57BBE45F5C}"/>
-              </a:ext>
-            </a:extLst>
-          </p:cNvPr>
-          <p:cNvCxnSpPr>
-            <a:cxnSpLocks/>
-          </p:cNvCxnSpPr>
-          <p:nvPr/>
-        </p:nvCxnSpPr>
-        <p:spPr>
-          <a:xfrm flipV="1">
-            <a:off x="4509837" y="1519834"/>
-            <a:ext cx="771845" cy="1905685"/>
-          </a:xfrm>
-          <a:prstGeom prst="straightConnector1">
-            <a:avLst/>
-          </a:prstGeom>
-          <a:ln w="25400">
-            <a:tailEnd type="triangle"/>
-          </a:ln>
-        </p:spPr>
-        <p:style>
-          <a:lnRef idx="1">
-            <a:schemeClr val="accent1"/>
-          </a:lnRef>
-          <a:fillRef idx="0">
-            <a:schemeClr val="accent1"/>
-          </a:fillRef>
-          <a:effectRef idx="0">
-            <a:schemeClr val="accent1"/>
-          </a:effectRef>
-          <a:fontRef idx="minor">
-            <a:schemeClr val="tx1"/>
-          </a:fontRef>
-        </p:style>
-      </p:cxnSp>
-      <p:sp>
-        <p:nvSpPr>
-          <p:cNvPr id="37" name="Oval 36">
-            <a:extLst>
-              <a:ext uri="{FF2B5EF4-FFF2-40B4-BE49-F238E27FC236}">
-                <a16:creationId xmlns:a16="http://schemas.microsoft.com/office/drawing/2014/main" id="{293CB91C-3310-43DC-85ED-DF68EF7FA09A}"/>
-              </a:ext>
-            </a:extLst>
-          </p:cNvPr>
-          <p:cNvSpPr/>
-          <p:nvPr/>
-        </p:nvSpPr>
-        <p:spPr>
-          <a:xfrm>
-            <a:off x="6773384" y="1216731"/>
-            <a:ext cx="355107" cy="355107"/>
-          </a:xfrm>
-          <a:prstGeom prst="ellipse">
-            <a:avLst/>
-          </a:prstGeom>
-        </p:spPr>
-        <p:style>
-          <a:lnRef idx="2">
-            <a:schemeClr val="accent1">
-              <a:shade val="50000"/>
-            </a:schemeClr>
-          </a:lnRef>
-          <a:fillRef idx="1">
-            <a:schemeClr val="accent1"/>
-          </a:fillRef>
-          <a:effectRef idx="0">
-            <a:schemeClr val="accent1"/>
-          </a:effectRef>
-          <a:fontRef idx="minor">
-            <a:schemeClr val="lt1"/>
-          </a:fontRef>
-        </p:style>
-        <p:txBody>
-          <a:bodyPr rtlCol="0" anchor="ctr"/>
-          <a:lstStyle/>
-          <a:p>
-            <a:pPr algn="ctr"/>
-            <a:r>
-              <a:rPr lang="en-US" dirty="0"/>
-              <a:t>l</a:t>
-            </a:r>
-          </a:p>
-        </p:txBody>
-      </p:sp>
-      <p:cxnSp>
-        <p:nvCxnSpPr>
-          <p:cNvPr id="38" name="Straight Arrow Connector 37">
-            <a:extLst>
-              <a:ext uri="{FF2B5EF4-FFF2-40B4-BE49-F238E27FC236}">
-                <a16:creationId xmlns:a16="http://schemas.microsoft.com/office/drawing/2014/main" id="{A5A890EC-66C0-4E6D-80F2-21B36833A982}"/>
-              </a:ext>
-            </a:extLst>
-          </p:cNvPr>
-          <p:cNvCxnSpPr>
-            <a:cxnSpLocks/>
-            <a:stCxn id="31" idx="6"/>
-            <a:endCxn id="37" idx="2"/>
-          </p:cNvCxnSpPr>
-          <p:nvPr/>
-        </p:nvCxnSpPr>
-        <p:spPr>
-          <a:xfrm>
-            <a:off x="5586920" y="1394285"/>
-            <a:ext cx="1186464" cy="0"/>
-          </a:xfrm>
-          <a:prstGeom prst="straightConnector1">
-            <a:avLst/>
-          </a:prstGeom>
-          <a:ln w="25400">
-            <a:tailEnd type="triangle"/>
-          </a:ln>
-        </p:spPr>
-        <p:style>
-          <a:lnRef idx="1">
-            <a:schemeClr val="accent1"/>
-          </a:lnRef>
-          <a:fillRef idx="0">
-            <a:schemeClr val="accent1"/>
-          </a:fillRef>
-          <a:effectRef idx="0">
-            <a:schemeClr val="accent1"/>
-          </a:effectRef>
-          <a:fontRef idx="minor">
-            <a:schemeClr val="tx1"/>
-          </a:fontRef>
-        </p:style>
-      </p:cxnSp>
-      <p:cxnSp>
-        <p:nvCxnSpPr>
-          <p:cNvPr id="39" name="Straight Arrow Connector 38">
-            <a:extLst>
-              <a:ext uri="{FF2B5EF4-FFF2-40B4-BE49-F238E27FC236}">
-                <a16:creationId xmlns:a16="http://schemas.microsoft.com/office/drawing/2014/main" id="{49B2183F-E46F-4D5C-A0A9-541E09941E30}"/>
-              </a:ext>
-            </a:extLst>
-          </p:cNvPr>
-          <p:cNvCxnSpPr>
-            <a:cxnSpLocks/>
-            <a:stCxn id="37" idx="6"/>
-            <a:endCxn id="40" idx="2"/>
-          </p:cNvCxnSpPr>
-          <p:nvPr/>
-        </p:nvCxnSpPr>
-        <p:spPr>
-          <a:xfrm flipV="1">
-            <a:off x="7128491" y="1394284"/>
-            <a:ext cx="349741" cy="1"/>
-          </a:xfrm>
-          <a:prstGeom prst="straightConnector1">
-            <a:avLst/>
-          </a:prstGeom>
-          <a:ln w="25400">
-            <a:tailEnd type="triangle"/>
-          </a:ln>
-        </p:spPr>
-        <p:style>
-          <a:lnRef idx="1">
-            <a:schemeClr val="accent1"/>
-          </a:lnRef>
-          <a:fillRef idx="0">
-            <a:schemeClr val="accent1"/>
-          </a:fillRef>
-          <a:effectRef idx="0">
-            <a:schemeClr val="accent1"/>
-          </a:effectRef>
-          <a:fontRef idx="minor">
-            <a:schemeClr val="tx1"/>
-          </a:fontRef>
-        </p:style>
-      </p:cxnSp>
-      <p:sp>
-        <p:nvSpPr>
-          <p:cNvPr id="40" name="Oval 39">
-            <a:extLst>
-              <a:ext uri="{FF2B5EF4-FFF2-40B4-BE49-F238E27FC236}">
-                <a16:creationId xmlns:a16="http://schemas.microsoft.com/office/drawing/2014/main" id="{2D7B87D1-650F-436E-92AB-0E7375645A80}"/>
-              </a:ext>
-            </a:extLst>
-          </p:cNvPr>
-          <p:cNvSpPr/>
-          <p:nvPr/>
-        </p:nvSpPr>
-        <p:spPr>
-          <a:xfrm>
-            <a:off x="7478232" y="1216730"/>
-            <a:ext cx="355107" cy="355107"/>
-          </a:xfrm>
-          <a:prstGeom prst="ellipse">
-            <a:avLst/>
-          </a:prstGeom>
-        </p:spPr>
-        <p:style>
-          <a:lnRef idx="2">
-            <a:schemeClr val="accent1">
-              <a:shade val="50000"/>
-            </a:schemeClr>
-          </a:lnRef>
-          <a:fillRef idx="1">
-            <a:schemeClr val="accent1"/>
-          </a:fillRef>
-          <a:effectRef idx="0">
-            <a:schemeClr val="accent1"/>
-          </a:effectRef>
-          <a:fontRef idx="minor">
-            <a:schemeClr val="lt1"/>
-          </a:fontRef>
-        </p:style>
-        <p:txBody>
-          <a:bodyPr rtlCol="0" anchor="ctr"/>
-          <a:lstStyle/>
-          <a:p>
-            <a:pPr algn="ctr"/>
-            <a:r>
-              <a:rPr lang="en-US" dirty="0"/>
-              <a:t>m</a:t>
-            </a:r>
-          </a:p>
-        </p:txBody>
-      </p:sp>
-      <p:cxnSp>
-        <p:nvCxnSpPr>
-          <p:cNvPr id="67" name="Straight Arrow Connector 66">
-            <a:extLst>
-              <a:ext uri="{FF2B5EF4-FFF2-40B4-BE49-F238E27FC236}">
-                <a16:creationId xmlns:a16="http://schemas.microsoft.com/office/drawing/2014/main" id="{39133767-3EC7-4821-A2A5-5488BF921FE1}"/>
-              </a:ext>
-            </a:extLst>
-          </p:cNvPr>
-          <p:cNvCxnSpPr>
-            <a:cxnSpLocks/>
-            <a:stCxn id="16" idx="7"/>
-            <a:endCxn id="37" idx="3"/>
-          </p:cNvCxnSpPr>
-          <p:nvPr/>
-        </p:nvCxnSpPr>
-        <p:spPr>
-          <a:xfrm flipV="1">
-            <a:off x="5071032" y="1519834"/>
-            <a:ext cx="1754356" cy="3099960"/>
-          </a:xfrm>
-          <a:prstGeom prst="straightConnector1">
-            <a:avLst/>
-          </a:prstGeom>
-          <a:ln>
-            <a:prstDash val="lgDashDot"/>
-            <a:tailEnd type="triangle"/>
-          </a:ln>
-        </p:spPr>
-        <p:style>
-          <a:lnRef idx="1">
-            <a:schemeClr val="accent1"/>
-          </a:lnRef>
-          <a:fillRef idx="0">
-            <a:schemeClr val="accent1"/>
-          </a:fillRef>
-          <a:effectRef idx="0">
-            <a:schemeClr val="accent1"/>
-          </a:effectRef>
-          <a:fontRef idx="minor">
-            <a:schemeClr val="tx1"/>
-          </a:fontRef>
-        </p:style>
-      </p:cxnSp>
-      <p:sp>
-        <p:nvSpPr>
-          <p:cNvPr id="71" name="Oval 70">
-            <a:extLst>
-              <a:ext uri="{FF2B5EF4-FFF2-40B4-BE49-F238E27FC236}">
-                <a16:creationId xmlns:a16="http://schemas.microsoft.com/office/drawing/2014/main" id="{FE2B6501-49A5-4180-89AA-44A4B50801F3}"/>
-              </a:ext>
-            </a:extLst>
-          </p:cNvPr>
-          <p:cNvSpPr/>
-          <p:nvPr/>
-        </p:nvSpPr>
-        <p:spPr>
-          <a:xfrm>
-            <a:off x="7966798" y="2107885"/>
-            <a:ext cx="355107" cy="355107"/>
-          </a:xfrm>
-          <a:prstGeom prst="ellipse">
-            <a:avLst/>
-          </a:prstGeom>
-        </p:spPr>
-        <p:style>
-          <a:lnRef idx="2">
-            <a:schemeClr val="accent1">
-              <a:shade val="50000"/>
-            </a:schemeClr>
-          </a:lnRef>
-          <a:fillRef idx="1">
-            <a:schemeClr val="accent1"/>
-          </a:fillRef>
-          <a:effectRef idx="0">
-            <a:schemeClr val="accent1"/>
-          </a:effectRef>
-          <a:fontRef idx="minor">
-            <a:schemeClr val="lt1"/>
-          </a:fontRef>
-        </p:style>
-        <p:txBody>
-          <a:bodyPr rtlCol="0" anchor="ctr"/>
-          <a:lstStyle/>
-          <a:p>
-            <a:pPr algn="ctr"/>
-            <a:r>
-              <a:rPr lang="en-US" dirty="0"/>
-              <a:t>n</a:t>
-            </a:r>
-          </a:p>
-        </p:txBody>
-      </p:sp>
-      <p:sp>
-        <p:nvSpPr>
-          <p:cNvPr id="72" name="Oval 71">
-            <a:extLst>
-              <a:ext uri="{FF2B5EF4-FFF2-40B4-BE49-F238E27FC236}">
-                <a16:creationId xmlns:a16="http://schemas.microsoft.com/office/drawing/2014/main" id="{8CCDF9BB-02A2-4D32-99AF-229302324B30}"/>
-              </a:ext>
-            </a:extLst>
-          </p:cNvPr>
-          <p:cNvSpPr/>
-          <p:nvPr/>
-        </p:nvSpPr>
-        <p:spPr>
-          <a:xfrm>
-            <a:off x="8641713" y="2107885"/>
-            <a:ext cx="355107" cy="355107"/>
-          </a:xfrm>
-          <a:prstGeom prst="ellipse">
-            <a:avLst/>
-          </a:prstGeom>
-        </p:spPr>
-        <p:style>
-          <a:lnRef idx="2">
-            <a:schemeClr val="accent1">
-              <a:shade val="50000"/>
-            </a:schemeClr>
-          </a:lnRef>
-          <a:fillRef idx="1">
-            <a:schemeClr val="accent1"/>
-          </a:fillRef>
-          <a:effectRef idx="0">
-            <a:schemeClr val="accent1"/>
-          </a:effectRef>
-          <a:fontRef idx="minor">
-            <a:schemeClr val="lt1"/>
-          </a:fontRef>
-        </p:style>
-        <p:txBody>
-          <a:bodyPr rtlCol="0" anchor="ctr"/>
-          <a:lstStyle/>
-          <a:p>
-            <a:pPr algn="ctr"/>
-            <a:r>
-              <a:rPr lang="en-US" dirty="0"/>
-              <a:t>o</a:t>
-            </a:r>
-          </a:p>
-        </p:txBody>
-      </p:sp>
-      <p:cxnSp>
-        <p:nvCxnSpPr>
-          <p:cNvPr id="73" name="Straight Arrow Connector 72">
-            <a:extLst>
-              <a:ext uri="{FF2B5EF4-FFF2-40B4-BE49-F238E27FC236}">
-                <a16:creationId xmlns:a16="http://schemas.microsoft.com/office/drawing/2014/main" id="{1EC237A2-E52F-4A25-973B-21EE59137E20}"/>
-              </a:ext>
-            </a:extLst>
-          </p:cNvPr>
-          <p:cNvCxnSpPr>
-            <a:cxnSpLocks/>
-            <a:stCxn id="28" idx="7"/>
-            <a:endCxn id="71" idx="3"/>
-          </p:cNvCxnSpPr>
-          <p:nvPr/>
-        </p:nvCxnSpPr>
-        <p:spPr>
-          <a:xfrm flipV="1">
-            <a:off x="6590228" y="2410988"/>
-            <a:ext cx="1428574" cy="1020855"/>
-          </a:xfrm>
-          <a:prstGeom prst="straightConnector1">
-            <a:avLst/>
-          </a:prstGeom>
-          <a:ln w="25400">
-            <a:tailEnd type="triangle"/>
-          </a:ln>
-        </p:spPr>
-        <p:style>
-          <a:lnRef idx="1">
-            <a:schemeClr val="accent1"/>
-          </a:lnRef>
-          <a:fillRef idx="0">
-            <a:schemeClr val="accent1"/>
-          </a:fillRef>
-          <a:effectRef idx="0">
-            <a:schemeClr val="accent1"/>
-          </a:effectRef>
-          <a:fontRef idx="minor">
-            <a:schemeClr val="tx1"/>
-          </a:fontRef>
-        </p:style>
-      </p:cxnSp>
-      <p:cxnSp>
-        <p:nvCxnSpPr>
-          <p:cNvPr id="80" name="Straight Arrow Connector 79">
-            <a:extLst>
-              <a:ext uri="{FF2B5EF4-FFF2-40B4-BE49-F238E27FC236}">
-                <a16:creationId xmlns:a16="http://schemas.microsoft.com/office/drawing/2014/main" id="{336ABAB3-8C19-494D-82AE-33A8E9948841}"/>
-              </a:ext>
-            </a:extLst>
-          </p:cNvPr>
-          <p:cNvCxnSpPr>
-            <a:cxnSpLocks/>
-            <a:stCxn id="71" idx="6"/>
-            <a:endCxn id="72" idx="2"/>
-          </p:cNvCxnSpPr>
-          <p:nvPr/>
-        </p:nvCxnSpPr>
-        <p:spPr>
-          <a:xfrm>
-            <a:off x="8321905" y="2285439"/>
-            <a:ext cx="319808" cy="0"/>
           </a:xfrm>
           <a:prstGeom prst="straightConnector1">
             <a:avLst/>
@@ -5378,7 +4267,7 @@
     </p:spTree>
     <p:extLst>
       <p:ext uri="{BB962C8B-B14F-4D97-AF65-F5344CB8AC3E}">
-        <p14:creationId xmlns:p14="http://schemas.microsoft.com/office/powerpoint/2010/main" val="3382432148"/>
+        <p14:creationId xmlns:p14="http://schemas.microsoft.com/office/powerpoint/2010/main" val="3185646862"/>
       </p:ext>
     </p:extLst>
   </p:cSld>
@@ -5466,6 +4355,65 @@
       </p:sp>
       <p:sp>
         <p:nvSpPr>
+          <p:cNvPr id="44" name="Rectangle 43">
+            <a:extLst>
+              <a:ext uri="{FF2B5EF4-FFF2-40B4-BE49-F238E27FC236}">
+                <a16:creationId xmlns:a16="http://schemas.microsoft.com/office/drawing/2014/main" id="{5BC2FAE5-EDC4-42E1-9456-5DA44D4A7225}"/>
+              </a:ext>
+            </a:extLst>
+          </p:cNvPr>
+          <p:cNvSpPr/>
+          <p:nvPr/>
+        </p:nvSpPr>
+        <p:spPr>
+          <a:xfrm>
+            <a:off x="2496487" y="4476239"/>
+            <a:ext cx="3683665" cy="656940"/>
+          </a:xfrm>
+          <a:prstGeom prst="rect">
+            <a:avLst/>
+          </a:prstGeom>
+          <a:solidFill>
+            <a:schemeClr val="accent2">
+              <a:lumMod val="75000"/>
+              <a:alpha val="30000"/>
+            </a:schemeClr>
+          </a:solidFill>
+          <a:ln w="19050"/>
+        </p:spPr>
+        <p:style>
+          <a:lnRef idx="2">
+            <a:schemeClr val="accent1">
+              <a:shade val="50000"/>
+            </a:schemeClr>
+          </a:lnRef>
+          <a:fillRef idx="1">
+            <a:schemeClr val="accent1"/>
+          </a:fillRef>
+          <a:effectRef idx="0">
+            <a:schemeClr val="accent1"/>
+          </a:effectRef>
+          <a:fontRef idx="minor">
+            <a:schemeClr val="lt1"/>
+          </a:fontRef>
+        </p:style>
+        <p:txBody>
+          <a:bodyPr rtlCol="0" anchor="b" anchorCtr="0"/>
+          <a:lstStyle/>
+          <a:p>
+            <a:r>
+              <a:rPr lang="en-US" sz="1200" dirty="0">
+                <a:solidFill>
+                  <a:schemeClr val="tx1"/>
+                </a:solidFill>
+              </a:rPr>
+              <a:t>feature-feature2</a:t>
+            </a:r>
+          </a:p>
+        </p:txBody>
+      </p:sp>
+      <p:sp>
+        <p:nvSpPr>
           <p:cNvPr id="42" name="Rectangle 41">
             <a:extLst>
               <a:ext uri="{FF2B5EF4-FFF2-40B4-BE49-F238E27FC236}">
@@ -5614,6 +4562,49 @@
           </a:fontRef>
         </p:style>
       </p:cxnSp>
+      <p:cxnSp>
+        <p:nvCxnSpPr>
+          <p:cNvPr id="7" name="Straight Arrow Connector 6">
+            <a:extLst>
+              <a:ext uri="{FF2B5EF4-FFF2-40B4-BE49-F238E27FC236}">
+                <a16:creationId xmlns:a16="http://schemas.microsoft.com/office/drawing/2014/main" id="{AF8EF468-C3FE-4998-9B4F-DCFFB6A5C17A}"/>
+              </a:ext>
+            </a:extLst>
+          </p:cNvPr>
+          <p:cNvCxnSpPr>
+            <a:cxnSpLocks/>
+            <a:stCxn id="4" idx="5"/>
+            <a:endCxn id="15" idx="2"/>
+          </p:cNvCxnSpPr>
+          <p:nvPr/>
+        </p:nvCxnSpPr>
+        <p:spPr>
+          <a:xfrm>
+            <a:off x="702657" y="3676618"/>
+            <a:ext cx="1927323" cy="1068727"/>
+          </a:xfrm>
+          <a:prstGeom prst="straightConnector1">
+            <a:avLst/>
+          </a:prstGeom>
+          <a:ln w="25400">
+            <a:tailEnd type="triangle"/>
+          </a:ln>
+        </p:spPr>
+        <p:style>
+          <a:lnRef idx="1">
+            <a:schemeClr val="accent1"/>
+          </a:lnRef>
+          <a:fillRef idx="0">
+            <a:schemeClr val="accent1"/>
+          </a:fillRef>
+          <a:effectRef idx="0">
+            <a:schemeClr val="accent1"/>
+          </a:effectRef>
+          <a:fontRef idx="minor">
+            <a:schemeClr val="tx1"/>
+          </a:fontRef>
+        </p:style>
+      </p:cxnSp>
       <p:sp>
         <p:nvSpPr>
           <p:cNvPr id="12" name="Oval 11">
@@ -5659,6 +4650,55 @@
             <a:r>
               <a:rPr lang="en-US" dirty="0"/>
               <a:t>b</a:t>
+            </a:r>
+          </a:p>
+        </p:txBody>
+      </p:sp>
+      <p:sp>
+        <p:nvSpPr>
+          <p:cNvPr id="15" name="Oval 14">
+            <a:extLst>
+              <a:ext uri="{FF2B5EF4-FFF2-40B4-BE49-F238E27FC236}">
+                <a16:creationId xmlns:a16="http://schemas.microsoft.com/office/drawing/2014/main" id="{579A86B5-8905-454F-9ED8-4348D2CAAF5D}"/>
+              </a:ext>
+            </a:extLst>
+          </p:cNvPr>
+          <p:cNvSpPr/>
+          <p:nvPr/>
+        </p:nvSpPr>
+        <p:spPr>
+          <a:xfrm>
+            <a:off x="2629980" y="4567791"/>
+            <a:ext cx="355107" cy="355107"/>
+          </a:xfrm>
+          <a:prstGeom prst="ellipse">
+            <a:avLst/>
+          </a:prstGeom>
+        </p:spPr>
+        <p:style>
+          <a:lnRef idx="2">
+            <a:schemeClr val="accent1">
+              <a:shade val="50000"/>
+            </a:schemeClr>
+          </a:lnRef>
+          <a:fillRef idx="1">
+            <a:schemeClr val="accent1"/>
+          </a:fillRef>
+          <a:effectRef idx="0">
+            <a:schemeClr val="accent1"/>
+          </a:effectRef>
+          <a:fontRef idx="minor">
+            <a:schemeClr val="lt1"/>
+          </a:fontRef>
+        </p:style>
+        <p:txBody>
+          <a:bodyPr rtlCol="0" anchor="ctr"/>
+          <a:lstStyle/>
+          <a:p>
+            <a:pPr algn="ctr"/>
+            <a:r>
+              <a:rPr lang="en-US" dirty="0"/>
+              <a:t>d</a:t>
             </a:r>
           </a:p>
         </p:txBody>
@@ -6074,6 +5114,324 @@
           </a:fontRef>
         </p:style>
       </p:cxnSp>
+      <p:sp>
+        <p:nvSpPr>
+          <p:cNvPr id="16" name="Oval 15">
+            <a:extLst>
+              <a:ext uri="{FF2B5EF4-FFF2-40B4-BE49-F238E27FC236}">
+                <a16:creationId xmlns:a16="http://schemas.microsoft.com/office/drawing/2014/main" id="{D6DEFA2E-7339-49EB-963A-BE8D7C695422}"/>
+              </a:ext>
+            </a:extLst>
+          </p:cNvPr>
+          <p:cNvSpPr/>
+          <p:nvPr/>
+        </p:nvSpPr>
+        <p:spPr>
+          <a:xfrm>
+            <a:off x="4767929" y="4567790"/>
+            <a:ext cx="355107" cy="355107"/>
+          </a:xfrm>
+          <a:prstGeom prst="ellipse">
+            <a:avLst/>
+          </a:prstGeom>
+        </p:spPr>
+        <p:style>
+          <a:lnRef idx="2">
+            <a:schemeClr val="accent1">
+              <a:shade val="50000"/>
+            </a:schemeClr>
+          </a:lnRef>
+          <a:fillRef idx="1">
+            <a:schemeClr val="accent1"/>
+          </a:fillRef>
+          <a:effectRef idx="0">
+            <a:schemeClr val="accent1"/>
+          </a:effectRef>
+          <a:fontRef idx="minor">
+            <a:schemeClr val="lt1"/>
+          </a:fontRef>
+        </p:style>
+        <p:txBody>
+          <a:bodyPr rtlCol="0" anchor="ctr"/>
+          <a:lstStyle/>
+          <a:p>
+            <a:pPr algn="ctr"/>
+            <a:r>
+              <a:rPr lang="en-US" dirty="0"/>
+              <a:t>h</a:t>
+            </a:r>
+          </a:p>
+        </p:txBody>
+      </p:sp>
+      <p:cxnSp>
+        <p:nvCxnSpPr>
+          <p:cNvPr id="17" name="Straight Arrow Connector 16">
+            <a:extLst>
+              <a:ext uri="{FF2B5EF4-FFF2-40B4-BE49-F238E27FC236}">
+                <a16:creationId xmlns:a16="http://schemas.microsoft.com/office/drawing/2014/main" id="{687CF31E-6039-4D80-A3F9-BAB0801EE342}"/>
+              </a:ext>
+            </a:extLst>
+          </p:cNvPr>
+          <p:cNvCxnSpPr>
+            <a:cxnSpLocks/>
+            <a:stCxn id="15" idx="6"/>
+            <a:endCxn id="16" idx="2"/>
+          </p:cNvCxnSpPr>
+          <p:nvPr/>
+        </p:nvCxnSpPr>
+        <p:spPr>
+          <a:xfrm flipV="1">
+            <a:off x="2985087" y="4745344"/>
+            <a:ext cx="1782842" cy="1"/>
+          </a:xfrm>
+          <a:prstGeom prst="straightConnector1">
+            <a:avLst/>
+          </a:prstGeom>
+          <a:ln w="25400">
+            <a:tailEnd type="triangle"/>
+          </a:ln>
+        </p:spPr>
+        <p:style>
+          <a:lnRef idx="1">
+            <a:schemeClr val="accent1"/>
+          </a:lnRef>
+          <a:fillRef idx="0">
+            <a:schemeClr val="accent1"/>
+          </a:fillRef>
+          <a:effectRef idx="0">
+            <a:schemeClr val="accent1"/>
+          </a:effectRef>
+          <a:fontRef idx="minor">
+            <a:schemeClr val="tx1"/>
+          </a:fontRef>
+        </p:style>
+      </p:cxnSp>
+      <p:sp>
+        <p:nvSpPr>
+          <p:cNvPr id="24" name="Oval 23">
+            <a:extLst>
+              <a:ext uri="{FF2B5EF4-FFF2-40B4-BE49-F238E27FC236}">
+                <a16:creationId xmlns:a16="http://schemas.microsoft.com/office/drawing/2014/main" id="{232A0D5E-E2B9-4DBE-9886-25514EEE2493}"/>
+              </a:ext>
+            </a:extLst>
+          </p:cNvPr>
+          <p:cNvSpPr/>
+          <p:nvPr/>
+        </p:nvSpPr>
+        <p:spPr>
+          <a:xfrm>
+            <a:off x="5683841" y="4567790"/>
+            <a:ext cx="355107" cy="355107"/>
+          </a:xfrm>
+          <a:prstGeom prst="ellipse">
+            <a:avLst/>
+          </a:prstGeom>
+        </p:spPr>
+        <p:style>
+          <a:lnRef idx="2">
+            <a:schemeClr val="accent1">
+              <a:shade val="50000"/>
+            </a:schemeClr>
+          </a:lnRef>
+          <a:fillRef idx="1">
+            <a:schemeClr val="accent1"/>
+          </a:fillRef>
+          <a:effectRef idx="0">
+            <a:schemeClr val="accent1"/>
+          </a:effectRef>
+          <a:fontRef idx="minor">
+            <a:schemeClr val="lt1"/>
+          </a:fontRef>
+        </p:style>
+        <p:txBody>
+          <a:bodyPr rtlCol="0" anchor="ctr"/>
+          <a:lstStyle/>
+          <a:p>
+            <a:pPr algn="ctr"/>
+            <a:r>
+              <a:rPr lang="en-US" dirty="0"/>
+              <a:t>j</a:t>
+            </a:r>
+          </a:p>
+        </p:txBody>
+      </p:sp>
+      <p:cxnSp>
+        <p:nvCxnSpPr>
+          <p:cNvPr id="25" name="Straight Arrow Connector 24">
+            <a:extLst>
+              <a:ext uri="{FF2B5EF4-FFF2-40B4-BE49-F238E27FC236}">
+                <a16:creationId xmlns:a16="http://schemas.microsoft.com/office/drawing/2014/main" id="{90C5DBDC-8C95-41B0-AE16-B6E21E847A64}"/>
+              </a:ext>
+            </a:extLst>
+          </p:cNvPr>
+          <p:cNvCxnSpPr>
+            <a:cxnSpLocks/>
+            <a:endCxn id="24" idx="1"/>
+          </p:cNvCxnSpPr>
+          <p:nvPr/>
+        </p:nvCxnSpPr>
+        <p:spPr>
+          <a:xfrm>
+            <a:off x="4563976" y="3676618"/>
+            <a:ext cx="1171869" cy="943176"/>
+          </a:xfrm>
+          <a:prstGeom prst="straightConnector1">
+            <a:avLst/>
+          </a:prstGeom>
+          <a:ln w="25400">
+            <a:tailEnd type="triangle"/>
+          </a:ln>
+        </p:spPr>
+        <p:style>
+          <a:lnRef idx="1">
+            <a:schemeClr val="accent1"/>
+          </a:lnRef>
+          <a:fillRef idx="0">
+            <a:schemeClr val="accent1"/>
+          </a:fillRef>
+          <a:effectRef idx="0">
+            <a:schemeClr val="accent1"/>
+          </a:effectRef>
+          <a:fontRef idx="minor">
+            <a:schemeClr val="tx1"/>
+          </a:fontRef>
+        </p:style>
+      </p:cxnSp>
+      <p:cxnSp>
+        <p:nvCxnSpPr>
+          <p:cNvPr id="27" name="Straight Arrow Connector 26">
+            <a:extLst>
+              <a:ext uri="{FF2B5EF4-FFF2-40B4-BE49-F238E27FC236}">
+                <a16:creationId xmlns:a16="http://schemas.microsoft.com/office/drawing/2014/main" id="{7DB98786-D659-4AC3-92C2-1A2FE8C27B93}"/>
+              </a:ext>
+            </a:extLst>
+          </p:cNvPr>
+          <p:cNvCxnSpPr>
+            <a:cxnSpLocks/>
+            <a:stCxn id="16" idx="6"/>
+            <a:endCxn id="24" idx="2"/>
+          </p:cNvCxnSpPr>
+          <p:nvPr/>
+        </p:nvCxnSpPr>
+        <p:spPr>
+          <a:xfrm>
+            <a:off x="5123036" y="4745344"/>
+            <a:ext cx="560805" cy="0"/>
+          </a:xfrm>
+          <a:prstGeom prst="straightConnector1">
+            <a:avLst/>
+          </a:prstGeom>
+          <a:ln w="25400">
+            <a:tailEnd type="triangle"/>
+          </a:ln>
+        </p:spPr>
+        <p:style>
+          <a:lnRef idx="1">
+            <a:schemeClr val="accent1"/>
+          </a:lnRef>
+          <a:fillRef idx="0">
+            <a:schemeClr val="accent1"/>
+          </a:fillRef>
+          <a:effectRef idx="0">
+            <a:schemeClr val="accent1"/>
+          </a:effectRef>
+          <a:fontRef idx="minor">
+            <a:schemeClr val="tx1"/>
+          </a:fontRef>
+        </p:style>
+      </p:cxnSp>
+      <p:sp>
+        <p:nvSpPr>
+          <p:cNvPr id="28" name="Oval 27">
+            <a:extLst>
+              <a:ext uri="{FF2B5EF4-FFF2-40B4-BE49-F238E27FC236}">
+                <a16:creationId xmlns:a16="http://schemas.microsoft.com/office/drawing/2014/main" id="{7F3812AE-7E85-40AB-9D3D-23A04778CB33}"/>
+              </a:ext>
+            </a:extLst>
+          </p:cNvPr>
+          <p:cNvSpPr/>
+          <p:nvPr/>
+        </p:nvSpPr>
+        <p:spPr>
+          <a:xfrm>
+            <a:off x="6287125" y="3379839"/>
+            <a:ext cx="355107" cy="355107"/>
+          </a:xfrm>
+          <a:prstGeom prst="ellipse">
+            <a:avLst/>
+          </a:prstGeom>
+        </p:spPr>
+        <p:style>
+          <a:lnRef idx="2">
+            <a:schemeClr val="accent1">
+              <a:shade val="50000"/>
+            </a:schemeClr>
+          </a:lnRef>
+          <a:fillRef idx="1">
+            <a:schemeClr val="accent1"/>
+          </a:fillRef>
+          <a:effectRef idx="0">
+            <a:schemeClr val="accent1"/>
+          </a:effectRef>
+          <a:fontRef idx="minor">
+            <a:schemeClr val="lt1"/>
+          </a:fontRef>
+        </p:style>
+        <p:txBody>
+          <a:bodyPr rtlCol="0" anchor="ctr"/>
+          <a:lstStyle/>
+          <a:p>
+            <a:pPr algn="ctr"/>
+            <a:r>
+              <a:rPr lang="en-US" dirty="0"/>
+              <a:t>k</a:t>
+            </a:r>
+          </a:p>
+        </p:txBody>
+      </p:sp>
+      <p:cxnSp>
+        <p:nvCxnSpPr>
+          <p:cNvPr id="30" name="Straight Arrow Connector 29">
+            <a:extLst>
+              <a:ext uri="{FF2B5EF4-FFF2-40B4-BE49-F238E27FC236}">
+                <a16:creationId xmlns:a16="http://schemas.microsoft.com/office/drawing/2014/main" id="{47B7DEDA-531C-4763-B4A1-09210BB148E7}"/>
+              </a:ext>
+            </a:extLst>
+          </p:cNvPr>
+          <p:cNvCxnSpPr>
+            <a:cxnSpLocks/>
+            <a:stCxn id="24" idx="7"/>
+            <a:endCxn id="28" idx="3"/>
+          </p:cNvCxnSpPr>
+          <p:nvPr/>
+        </p:nvCxnSpPr>
+        <p:spPr>
+          <a:xfrm flipV="1">
+            <a:off x="5986944" y="3682942"/>
+            <a:ext cx="352185" cy="936852"/>
+          </a:xfrm>
+          <a:prstGeom prst="straightConnector1">
+            <a:avLst/>
+          </a:prstGeom>
+          <a:ln w="25400">
+            <a:tailEnd type="triangle"/>
+          </a:ln>
+        </p:spPr>
+        <p:style>
+          <a:lnRef idx="1">
+            <a:schemeClr val="accent1"/>
+          </a:lnRef>
+          <a:fillRef idx="0">
+            <a:schemeClr val="accent1"/>
+          </a:fillRef>
+          <a:effectRef idx="0">
+            <a:schemeClr val="accent1"/>
+          </a:effectRef>
+          <a:fontRef idx="minor">
+            <a:schemeClr val="tx1"/>
+          </a:fontRef>
+        </p:style>
+      </p:cxnSp>
       <p:cxnSp>
         <p:nvCxnSpPr>
           <p:cNvPr id="34" name="Straight Arrow Connector 33">
@@ -6086,6 +5444,7 @@
           <p:cNvCxnSpPr>
             <a:cxnSpLocks/>
             <a:stCxn id="32" idx="6"/>
+            <a:endCxn id="28" idx="2"/>
           </p:cNvCxnSpPr>
           <p:nvPr/>
         </p:nvCxnSpPr>
@@ -6119,7 +5478,7 @@
     </p:spTree>
     <p:extLst>
       <p:ext uri="{BB962C8B-B14F-4D97-AF65-F5344CB8AC3E}">
-        <p14:creationId xmlns:p14="http://schemas.microsoft.com/office/powerpoint/2010/main" val="3185646862"/>
+        <p14:creationId xmlns:p14="http://schemas.microsoft.com/office/powerpoint/2010/main" val="2595135973"/>
       </p:ext>
     </p:extLst>
   </p:cSld>
@@ -6148,6 +5507,122 @@
       </p:grpSpPr>
       <p:sp>
         <p:nvSpPr>
+          <p:cNvPr id="79" name="Rectangle 78">
+            <a:extLst>
+              <a:ext uri="{FF2B5EF4-FFF2-40B4-BE49-F238E27FC236}">
+                <a16:creationId xmlns:a16="http://schemas.microsoft.com/office/drawing/2014/main" id="{79162968-0856-47E9-B068-327A6AFDC972}"/>
+              </a:ext>
+            </a:extLst>
+          </p:cNvPr>
+          <p:cNvSpPr/>
+          <p:nvPr/>
+        </p:nvSpPr>
+        <p:spPr>
+          <a:xfrm>
+            <a:off x="7840999" y="1872136"/>
+            <a:ext cx="1491874" cy="656940"/>
+          </a:xfrm>
+          <a:prstGeom prst="rect">
+            <a:avLst/>
+          </a:prstGeom>
+          <a:solidFill>
+            <a:srgbClr val="00B050">
+              <a:alpha val="30000"/>
+            </a:srgbClr>
+          </a:solidFill>
+          <a:ln w="19050"/>
+        </p:spPr>
+        <p:style>
+          <a:lnRef idx="2">
+            <a:schemeClr val="accent1">
+              <a:shade val="50000"/>
+            </a:schemeClr>
+          </a:lnRef>
+          <a:fillRef idx="1">
+            <a:schemeClr val="accent1"/>
+          </a:fillRef>
+          <a:effectRef idx="0">
+            <a:schemeClr val="accent1"/>
+          </a:effectRef>
+          <a:fontRef idx="minor">
+            <a:schemeClr val="lt1"/>
+          </a:fontRef>
+        </p:style>
+        <p:txBody>
+          <a:bodyPr rtlCol="0" anchor="t" anchorCtr="0"/>
+          <a:lstStyle/>
+          <a:p>
+            <a:r>
+              <a:rPr lang="en-US" sz="1200" dirty="0">
+                <a:solidFill>
+                  <a:schemeClr val="tx1"/>
+                </a:solidFill>
+              </a:rPr>
+              <a:t>release-mkt2</a:t>
+            </a:r>
+          </a:p>
+        </p:txBody>
+      </p:sp>
+      <p:sp>
+        <p:nvSpPr>
+          <p:cNvPr id="45" name="Rectangle 44">
+            <a:extLst>
+              <a:ext uri="{FF2B5EF4-FFF2-40B4-BE49-F238E27FC236}">
+                <a16:creationId xmlns:a16="http://schemas.microsoft.com/office/drawing/2014/main" id="{BD794871-0F14-40F2-B203-9660E5DC1E36}"/>
+              </a:ext>
+            </a:extLst>
+          </p:cNvPr>
+          <p:cNvSpPr/>
+          <p:nvPr/>
+        </p:nvSpPr>
+        <p:spPr>
+          <a:xfrm>
+            <a:off x="5056234" y="992983"/>
+            <a:ext cx="2816888" cy="656940"/>
+          </a:xfrm>
+          <a:prstGeom prst="rect">
+            <a:avLst/>
+          </a:prstGeom>
+          <a:solidFill>
+            <a:srgbClr val="00B050">
+              <a:alpha val="30000"/>
+            </a:srgbClr>
+          </a:solidFill>
+          <a:ln w="19050"/>
+        </p:spPr>
+        <p:style>
+          <a:lnRef idx="2">
+            <a:schemeClr val="accent1">
+              <a:shade val="50000"/>
+            </a:schemeClr>
+          </a:lnRef>
+          <a:fillRef idx="1">
+            <a:schemeClr val="accent1"/>
+          </a:fillRef>
+          <a:effectRef idx="0">
+            <a:schemeClr val="accent1"/>
+          </a:effectRef>
+          <a:fontRef idx="minor">
+            <a:schemeClr val="lt1"/>
+          </a:fontRef>
+        </p:style>
+        <p:txBody>
+          <a:bodyPr rtlCol="0" anchor="t" anchorCtr="0"/>
+          <a:lstStyle/>
+          <a:p>
+            <a:r>
+              <a:rPr lang="en-US" sz="1200" dirty="0">
+                <a:solidFill>
+                  <a:schemeClr val="tx1"/>
+                </a:solidFill>
+              </a:rPr>
+              <a:t>release-mkt1</a:t>
+            </a:r>
+          </a:p>
+        </p:txBody>
+      </p:sp>
+      <p:sp>
+        <p:nvSpPr>
           <p:cNvPr id="43" name="Rectangle 42">
             <a:extLst>
               <a:ext uri="{FF2B5EF4-FFF2-40B4-BE49-F238E27FC236}">
@@ -6195,13 +5670,18 @@
           <a:lstStyle/>
           <a:p>
             <a:r>
-              <a:rPr lang="en-US" sz="1200" dirty="0">
+              <a:rPr lang="en-US" sz="1200">
                 <a:solidFill>
                   <a:schemeClr val="tx1"/>
                 </a:solidFill>
               </a:rPr>
               <a:t>feture-feature1</a:t>
             </a:r>
+            <a:endParaRPr lang="en-US" sz="1200" dirty="0">
+              <a:solidFill>
+                <a:schemeClr val="tx1"/>
+              </a:solidFill>
+            </a:endParaRPr>
           </a:p>
         </p:txBody>
       </p:sp>
@@ -7327,10 +6807,513 @@
           </a:fontRef>
         </p:style>
       </p:cxnSp>
+      <p:sp>
+        <p:nvSpPr>
+          <p:cNvPr id="31" name="Oval 30">
+            <a:extLst>
+              <a:ext uri="{FF2B5EF4-FFF2-40B4-BE49-F238E27FC236}">
+                <a16:creationId xmlns:a16="http://schemas.microsoft.com/office/drawing/2014/main" id="{AE2B203A-6FD7-4FDA-9B72-6701AE951F9C}"/>
+              </a:ext>
+            </a:extLst>
+          </p:cNvPr>
+          <p:cNvSpPr/>
+          <p:nvPr/>
+        </p:nvSpPr>
+        <p:spPr>
+          <a:xfrm>
+            <a:off x="5231813" y="1216731"/>
+            <a:ext cx="355107" cy="355107"/>
+          </a:xfrm>
+          <a:prstGeom prst="ellipse">
+            <a:avLst/>
+          </a:prstGeom>
+        </p:spPr>
+        <p:style>
+          <a:lnRef idx="2">
+            <a:schemeClr val="accent1">
+              <a:shade val="50000"/>
+            </a:schemeClr>
+          </a:lnRef>
+          <a:fillRef idx="1">
+            <a:schemeClr val="accent1"/>
+          </a:fillRef>
+          <a:effectRef idx="0">
+            <a:schemeClr val="accent1"/>
+          </a:effectRef>
+          <a:fontRef idx="minor">
+            <a:schemeClr val="lt1"/>
+          </a:fontRef>
+        </p:style>
+        <p:txBody>
+          <a:bodyPr rtlCol="0" anchor="ctr"/>
+          <a:lstStyle/>
+          <a:p>
+            <a:pPr algn="ctr"/>
+            <a:r>
+              <a:rPr lang="en-US" dirty="0" err="1"/>
+              <a:t>i</a:t>
+            </a:r>
+            <a:endParaRPr lang="en-US" dirty="0"/>
+          </a:p>
+        </p:txBody>
+      </p:sp>
+      <p:cxnSp>
+        <p:nvCxnSpPr>
+          <p:cNvPr id="35" name="Straight Arrow Connector 34">
+            <a:extLst>
+              <a:ext uri="{FF2B5EF4-FFF2-40B4-BE49-F238E27FC236}">
+                <a16:creationId xmlns:a16="http://schemas.microsoft.com/office/drawing/2014/main" id="{1AFCD651-23DF-4F6E-A765-0F57BBE45F5C}"/>
+              </a:ext>
+            </a:extLst>
+          </p:cNvPr>
+          <p:cNvCxnSpPr>
+            <a:cxnSpLocks/>
+          </p:cNvCxnSpPr>
+          <p:nvPr/>
+        </p:nvCxnSpPr>
+        <p:spPr>
+          <a:xfrm flipV="1">
+            <a:off x="4509837" y="1519834"/>
+            <a:ext cx="771845" cy="1905685"/>
+          </a:xfrm>
+          <a:prstGeom prst="straightConnector1">
+            <a:avLst/>
+          </a:prstGeom>
+          <a:ln w="25400">
+            <a:tailEnd type="triangle"/>
+          </a:ln>
+        </p:spPr>
+        <p:style>
+          <a:lnRef idx="1">
+            <a:schemeClr val="accent1"/>
+          </a:lnRef>
+          <a:fillRef idx="0">
+            <a:schemeClr val="accent1"/>
+          </a:fillRef>
+          <a:effectRef idx="0">
+            <a:schemeClr val="accent1"/>
+          </a:effectRef>
+          <a:fontRef idx="minor">
+            <a:schemeClr val="tx1"/>
+          </a:fontRef>
+        </p:style>
+      </p:cxnSp>
+      <p:sp>
+        <p:nvSpPr>
+          <p:cNvPr id="37" name="Oval 36">
+            <a:extLst>
+              <a:ext uri="{FF2B5EF4-FFF2-40B4-BE49-F238E27FC236}">
+                <a16:creationId xmlns:a16="http://schemas.microsoft.com/office/drawing/2014/main" id="{293CB91C-3310-43DC-85ED-DF68EF7FA09A}"/>
+              </a:ext>
+            </a:extLst>
+          </p:cNvPr>
+          <p:cNvSpPr/>
+          <p:nvPr/>
+        </p:nvSpPr>
+        <p:spPr>
+          <a:xfrm>
+            <a:off x="6773384" y="1216731"/>
+            <a:ext cx="355107" cy="355107"/>
+          </a:xfrm>
+          <a:prstGeom prst="ellipse">
+            <a:avLst/>
+          </a:prstGeom>
+        </p:spPr>
+        <p:style>
+          <a:lnRef idx="2">
+            <a:schemeClr val="accent1">
+              <a:shade val="50000"/>
+            </a:schemeClr>
+          </a:lnRef>
+          <a:fillRef idx="1">
+            <a:schemeClr val="accent1"/>
+          </a:fillRef>
+          <a:effectRef idx="0">
+            <a:schemeClr val="accent1"/>
+          </a:effectRef>
+          <a:fontRef idx="minor">
+            <a:schemeClr val="lt1"/>
+          </a:fontRef>
+        </p:style>
+        <p:txBody>
+          <a:bodyPr rtlCol="0" anchor="ctr"/>
+          <a:lstStyle/>
+          <a:p>
+            <a:pPr algn="ctr"/>
+            <a:r>
+              <a:rPr lang="en-US" dirty="0"/>
+              <a:t>l</a:t>
+            </a:r>
+          </a:p>
+        </p:txBody>
+      </p:sp>
+      <p:cxnSp>
+        <p:nvCxnSpPr>
+          <p:cNvPr id="38" name="Straight Arrow Connector 37">
+            <a:extLst>
+              <a:ext uri="{FF2B5EF4-FFF2-40B4-BE49-F238E27FC236}">
+                <a16:creationId xmlns:a16="http://schemas.microsoft.com/office/drawing/2014/main" id="{A5A890EC-66C0-4E6D-80F2-21B36833A982}"/>
+              </a:ext>
+            </a:extLst>
+          </p:cNvPr>
+          <p:cNvCxnSpPr>
+            <a:cxnSpLocks/>
+            <a:stCxn id="31" idx="6"/>
+            <a:endCxn id="37" idx="2"/>
+          </p:cNvCxnSpPr>
+          <p:nvPr/>
+        </p:nvCxnSpPr>
+        <p:spPr>
+          <a:xfrm>
+            <a:off x="5586920" y="1394285"/>
+            <a:ext cx="1186464" cy="0"/>
+          </a:xfrm>
+          <a:prstGeom prst="straightConnector1">
+            <a:avLst/>
+          </a:prstGeom>
+          <a:ln w="25400">
+            <a:tailEnd type="triangle"/>
+          </a:ln>
+        </p:spPr>
+        <p:style>
+          <a:lnRef idx="1">
+            <a:schemeClr val="accent1"/>
+          </a:lnRef>
+          <a:fillRef idx="0">
+            <a:schemeClr val="accent1"/>
+          </a:fillRef>
+          <a:effectRef idx="0">
+            <a:schemeClr val="accent1"/>
+          </a:effectRef>
+          <a:fontRef idx="minor">
+            <a:schemeClr val="tx1"/>
+          </a:fontRef>
+        </p:style>
+      </p:cxnSp>
+      <p:cxnSp>
+        <p:nvCxnSpPr>
+          <p:cNvPr id="39" name="Straight Arrow Connector 38">
+            <a:extLst>
+              <a:ext uri="{FF2B5EF4-FFF2-40B4-BE49-F238E27FC236}">
+                <a16:creationId xmlns:a16="http://schemas.microsoft.com/office/drawing/2014/main" id="{49B2183F-E46F-4D5C-A0A9-541E09941E30}"/>
+              </a:ext>
+            </a:extLst>
+          </p:cNvPr>
+          <p:cNvCxnSpPr>
+            <a:cxnSpLocks/>
+            <a:stCxn id="37" idx="6"/>
+            <a:endCxn id="40" idx="2"/>
+          </p:cNvCxnSpPr>
+          <p:nvPr/>
+        </p:nvCxnSpPr>
+        <p:spPr>
+          <a:xfrm flipV="1">
+            <a:off x="7128491" y="1394284"/>
+            <a:ext cx="349741" cy="1"/>
+          </a:xfrm>
+          <a:prstGeom prst="straightConnector1">
+            <a:avLst/>
+          </a:prstGeom>
+          <a:ln w="25400">
+            <a:tailEnd type="triangle"/>
+          </a:ln>
+        </p:spPr>
+        <p:style>
+          <a:lnRef idx="1">
+            <a:schemeClr val="accent1"/>
+          </a:lnRef>
+          <a:fillRef idx="0">
+            <a:schemeClr val="accent1"/>
+          </a:fillRef>
+          <a:effectRef idx="0">
+            <a:schemeClr val="accent1"/>
+          </a:effectRef>
+          <a:fontRef idx="minor">
+            <a:schemeClr val="tx1"/>
+          </a:fontRef>
+        </p:style>
+      </p:cxnSp>
+      <p:sp>
+        <p:nvSpPr>
+          <p:cNvPr id="40" name="Oval 39">
+            <a:extLst>
+              <a:ext uri="{FF2B5EF4-FFF2-40B4-BE49-F238E27FC236}">
+                <a16:creationId xmlns:a16="http://schemas.microsoft.com/office/drawing/2014/main" id="{2D7B87D1-650F-436E-92AB-0E7375645A80}"/>
+              </a:ext>
+            </a:extLst>
+          </p:cNvPr>
+          <p:cNvSpPr/>
+          <p:nvPr/>
+        </p:nvSpPr>
+        <p:spPr>
+          <a:xfrm>
+            <a:off x="7478232" y="1216730"/>
+            <a:ext cx="355107" cy="355107"/>
+          </a:xfrm>
+          <a:prstGeom prst="ellipse">
+            <a:avLst/>
+          </a:prstGeom>
+        </p:spPr>
+        <p:style>
+          <a:lnRef idx="2">
+            <a:schemeClr val="accent1">
+              <a:shade val="50000"/>
+            </a:schemeClr>
+          </a:lnRef>
+          <a:fillRef idx="1">
+            <a:schemeClr val="accent1"/>
+          </a:fillRef>
+          <a:effectRef idx="0">
+            <a:schemeClr val="accent1"/>
+          </a:effectRef>
+          <a:fontRef idx="minor">
+            <a:schemeClr val="lt1"/>
+          </a:fontRef>
+        </p:style>
+        <p:txBody>
+          <a:bodyPr rtlCol="0" anchor="ctr"/>
+          <a:lstStyle/>
+          <a:p>
+            <a:pPr algn="ctr"/>
+            <a:r>
+              <a:rPr lang="en-US" dirty="0"/>
+              <a:t>m</a:t>
+            </a:r>
+          </a:p>
+        </p:txBody>
+      </p:sp>
+      <p:cxnSp>
+        <p:nvCxnSpPr>
+          <p:cNvPr id="67" name="Straight Arrow Connector 66">
+            <a:extLst>
+              <a:ext uri="{FF2B5EF4-FFF2-40B4-BE49-F238E27FC236}">
+                <a16:creationId xmlns:a16="http://schemas.microsoft.com/office/drawing/2014/main" id="{39133767-3EC7-4821-A2A5-5488BF921FE1}"/>
+              </a:ext>
+            </a:extLst>
+          </p:cNvPr>
+          <p:cNvCxnSpPr>
+            <a:cxnSpLocks/>
+            <a:stCxn id="16" idx="7"/>
+            <a:endCxn id="37" idx="3"/>
+          </p:cNvCxnSpPr>
+          <p:nvPr/>
+        </p:nvCxnSpPr>
+        <p:spPr>
+          <a:xfrm flipV="1">
+            <a:off x="5071032" y="1519834"/>
+            <a:ext cx="1754356" cy="3099960"/>
+          </a:xfrm>
+          <a:prstGeom prst="straightConnector1">
+            <a:avLst/>
+          </a:prstGeom>
+          <a:ln>
+            <a:prstDash val="lgDashDot"/>
+            <a:tailEnd type="triangle"/>
+          </a:ln>
+        </p:spPr>
+        <p:style>
+          <a:lnRef idx="1">
+            <a:schemeClr val="accent1"/>
+          </a:lnRef>
+          <a:fillRef idx="0">
+            <a:schemeClr val="accent1"/>
+          </a:fillRef>
+          <a:effectRef idx="0">
+            <a:schemeClr val="accent1"/>
+          </a:effectRef>
+          <a:fontRef idx="minor">
+            <a:schemeClr val="tx1"/>
+          </a:fontRef>
+        </p:style>
+      </p:cxnSp>
+      <p:sp>
+        <p:nvSpPr>
+          <p:cNvPr id="71" name="Oval 70">
+            <a:extLst>
+              <a:ext uri="{FF2B5EF4-FFF2-40B4-BE49-F238E27FC236}">
+                <a16:creationId xmlns:a16="http://schemas.microsoft.com/office/drawing/2014/main" id="{FE2B6501-49A5-4180-89AA-44A4B50801F3}"/>
+              </a:ext>
+            </a:extLst>
+          </p:cNvPr>
+          <p:cNvSpPr/>
+          <p:nvPr/>
+        </p:nvSpPr>
+        <p:spPr>
+          <a:xfrm>
+            <a:off x="7966798" y="2107885"/>
+            <a:ext cx="355107" cy="355107"/>
+          </a:xfrm>
+          <a:prstGeom prst="ellipse">
+            <a:avLst/>
+          </a:prstGeom>
+        </p:spPr>
+        <p:style>
+          <a:lnRef idx="2">
+            <a:schemeClr val="accent1">
+              <a:shade val="50000"/>
+            </a:schemeClr>
+          </a:lnRef>
+          <a:fillRef idx="1">
+            <a:schemeClr val="accent1"/>
+          </a:fillRef>
+          <a:effectRef idx="0">
+            <a:schemeClr val="accent1"/>
+          </a:effectRef>
+          <a:fontRef idx="minor">
+            <a:schemeClr val="lt1"/>
+          </a:fontRef>
+        </p:style>
+        <p:txBody>
+          <a:bodyPr rtlCol="0" anchor="ctr"/>
+          <a:lstStyle/>
+          <a:p>
+            <a:pPr algn="ctr"/>
+            <a:r>
+              <a:rPr lang="en-US" dirty="0"/>
+              <a:t>n</a:t>
+            </a:r>
+          </a:p>
+        </p:txBody>
+      </p:sp>
+      <p:sp>
+        <p:nvSpPr>
+          <p:cNvPr id="72" name="Oval 71">
+            <a:extLst>
+              <a:ext uri="{FF2B5EF4-FFF2-40B4-BE49-F238E27FC236}">
+                <a16:creationId xmlns:a16="http://schemas.microsoft.com/office/drawing/2014/main" id="{8CCDF9BB-02A2-4D32-99AF-229302324B30}"/>
+              </a:ext>
+            </a:extLst>
+          </p:cNvPr>
+          <p:cNvSpPr/>
+          <p:nvPr/>
+        </p:nvSpPr>
+        <p:spPr>
+          <a:xfrm>
+            <a:off x="8641713" y="2107885"/>
+            <a:ext cx="355107" cy="355107"/>
+          </a:xfrm>
+          <a:prstGeom prst="ellipse">
+            <a:avLst/>
+          </a:prstGeom>
+        </p:spPr>
+        <p:style>
+          <a:lnRef idx="2">
+            <a:schemeClr val="accent1">
+              <a:shade val="50000"/>
+            </a:schemeClr>
+          </a:lnRef>
+          <a:fillRef idx="1">
+            <a:schemeClr val="accent1"/>
+          </a:fillRef>
+          <a:effectRef idx="0">
+            <a:schemeClr val="accent1"/>
+          </a:effectRef>
+          <a:fontRef idx="minor">
+            <a:schemeClr val="lt1"/>
+          </a:fontRef>
+        </p:style>
+        <p:txBody>
+          <a:bodyPr rtlCol="0" anchor="ctr"/>
+          <a:lstStyle/>
+          <a:p>
+            <a:pPr algn="ctr"/>
+            <a:r>
+              <a:rPr lang="en-US" dirty="0"/>
+              <a:t>o</a:t>
+            </a:r>
+          </a:p>
+        </p:txBody>
+      </p:sp>
+      <p:cxnSp>
+        <p:nvCxnSpPr>
+          <p:cNvPr id="73" name="Straight Arrow Connector 72">
+            <a:extLst>
+              <a:ext uri="{FF2B5EF4-FFF2-40B4-BE49-F238E27FC236}">
+                <a16:creationId xmlns:a16="http://schemas.microsoft.com/office/drawing/2014/main" id="{1EC237A2-E52F-4A25-973B-21EE59137E20}"/>
+              </a:ext>
+            </a:extLst>
+          </p:cNvPr>
+          <p:cNvCxnSpPr>
+            <a:cxnSpLocks/>
+            <a:stCxn id="28" idx="7"/>
+            <a:endCxn id="71" idx="3"/>
+          </p:cNvCxnSpPr>
+          <p:nvPr/>
+        </p:nvCxnSpPr>
+        <p:spPr>
+          <a:xfrm flipV="1">
+            <a:off x="6590228" y="2410988"/>
+            <a:ext cx="1428574" cy="1020855"/>
+          </a:xfrm>
+          <a:prstGeom prst="straightConnector1">
+            <a:avLst/>
+          </a:prstGeom>
+          <a:ln w="25400">
+            <a:tailEnd type="triangle"/>
+          </a:ln>
+        </p:spPr>
+        <p:style>
+          <a:lnRef idx="1">
+            <a:schemeClr val="accent1"/>
+          </a:lnRef>
+          <a:fillRef idx="0">
+            <a:schemeClr val="accent1"/>
+          </a:fillRef>
+          <a:effectRef idx="0">
+            <a:schemeClr val="accent1"/>
+          </a:effectRef>
+          <a:fontRef idx="minor">
+            <a:schemeClr val="tx1"/>
+          </a:fontRef>
+        </p:style>
+      </p:cxnSp>
+      <p:cxnSp>
+        <p:nvCxnSpPr>
+          <p:cNvPr id="80" name="Straight Arrow Connector 79">
+            <a:extLst>
+              <a:ext uri="{FF2B5EF4-FFF2-40B4-BE49-F238E27FC236}">
+                <a16:creationId xmlns:a16="http://schemas.microsoft.com/office/drawing/2014/main" id="{336ABAB3-8C19-494D-82AE-33A8E9948841}"/>
+              </a:ext>
+            </a:extLst>
+          </p:cNvPr>
+          <p:cNvCxnSpPr>
+            <a:cxnSpLocks/>
+            <a:stCxn id="71" idx="6"/>
+            <a:endCxn id="72" idx="2"/>
+          </p:cNvCxnSpPr>
+          <p:nvPr/>
+        </p:nvCxnSpPr>
+        <p:spPr>
+          <a:xfrm>
+            <a:off x="8321905" y="2285439"/>
+            <a:ext cx="319808" cy="0"/>
+          </a:xfrm>
+          <a:prstGeom prst="straightConnector1">
+            <a:avLst/>
+          </a:prstGeom>
+          <a:ln w="25400">
+            <a:tailEnd type="triangle"/>
+          </a:ln>
+        </p:spPr>
+        <p:style>
+          <a:lnRef idx="1">
+            <a:schemeClr val="accent1"/>
+          </a:lnRef>
+          <a:fillRef idx="0">
+            <a:schemeClr val="accent1"/>
+          </a:fillRef>
+          <a:effectRef idx="0">
+            <a:schemeClr val="accent1"/>
+          </a:effectRef>
+          <a:fontRef idx="minor">
+            <a:schemeClr val="tx1"/>
+          </a:fontRef>
+        </p:style>
+      </p:cxnSp>
     </p:spTree>
     <p:extLst>
       <p:ext uri="{BB962C8B-B14F-4D97-AF65-F5344CB8AC3E}">
-        <p14:creationId xmlns:p14="http://schemas.microsoft.com/office/powerpoint/2010/main" val="2595135973"/>
+        <p14:creationId xmlns:p14="http://schemas.microsoft.com/office/powerpoint/2010/main" val="3382432148"/>
       </p:ext>
     </p:extLst>
   </p:cSld>

</xml_diff>